<commit_message>
Few updates on Projet Preview.
</commit_message>
<xml_diff>
--- a/docs/Projet_Preview.pptx
+++ b/docs/Projet_Preview.pptx
@@ -2661,6 +2661,29 @@
     </pc:docChg>
   </pc:docChgLst>
   <pc:docChgLst>
+    <pc:chgData name="Mélissa Zhou" userId="071ed09a453febb9" providerId="Windows Live" clId="Web-{0C8E98EA-EA82-4315-AE2C-65D585AAA83F}"/>
+    <pc:docChg chg="modSld">
+      <pc:chgData name="Mélissa Zhou" userId="071ed09a453febb9" providerId="Windows Live" clId="Web-{0C8E98EA-EA82-4315-AE2C-65D585AAA83F}" dt="2022-06-15T15:21:11.310" v="5"/>
+      <pc:docMkLst>
+        <pc:docMk/>
+      </pc:docMkLst>
+      <pc:sldChg chg="modNotes">
+        <pc:chgData name="Mélissa Zhou" userId="071ed09a453febb9" providerId="Windows Live" clId="Web-{0C8E98EA-EA82-4315-AE2C-65D585AAA83F}" dt="2022-06-15T15:21:11.310" v="5"/>
+        <pc:sldMkLst>
+          <pc:docMk/>
+          <pc:sldMk cId="152930187" sldId="258"/>
+        </pc:sldMkLst>
+      </pc:sldChg>
+      <pc:sldChg chg="modNotes">
+        <pc:chgData name="Mélissa Zhou" userId="071ed09a453febb9" providerId="Windows Live" clId="Web-{0C8E98EA-EA82-4315-AE2C-65D585AAA83F}" dt="2022-06-15T15:17:38.352" v="1"/>
+        <pc:sldMkLst>
+          <pc:docMk/>
+          <pc:sldMk cId="1362687017" sldId="261"/>
+        </pc:sldMkLst>
+      </pc:sldChg>
+    </pc:docChg>
+  </pc:docChgLst>
+  <pc:docChgLst>
     <pc:chgData name="Mélissa Zhou" userId="071ed09a453febb9" providerId="Windows Live" clId="Web-{6570FDFD-365E-4556-B4F4-64B3C7BF1416}"/>
     <pc:docChg chg="addSld delSld">
       <pc:chgData name="Mélissa Zhou" userId="071ed09a453febb9" providerId="Windows Live" clId="Web-{6570FDFD-365E-4556-B4F4-64B3C7BF1416}" dt="2022-06-10T13:46:28.907" v="1"/>
@@ -2760,7 +2783,7 @@
           </a:lstStyle>
           <a:p>
             <a:fld id="{4C0A6B73-368C-4AE4-B172-98645D69DAC5}" type="datetimeFigureOut">
-              <a:t>6/10/2022</a:t>
+              <a:t>15/06/2022</a:t>
             </a:fld>
             <a:endParaRPr lang="fr-FR"/>
           </a:p>
@@ -2917,7 +2940,7 @@
           </a:lstStyle>
           <a:p>
             <a:fld id="{DA63055B-B41F-4580-8B0E-A9D7CE285253}" type="slidenum">
-              <a:t>‹#›</a:t>
+              <a:t>‹N°›</a:t>
             </a:fld>
             <a:endParaRPr lang="fr-FR"/>
           </a:p>
@@ -3215,10 +3238,23 @@
           <a:lstStyle/>
           <a:p>
             <a:r>
-              <a:rPr lang="en-US"/>
+              <a:rPr lang="en-US" dirty="0">
+                <a:hlinkClick r:id="rId3"/>
+              </a:rPr>
               <a:t>https://mdbootstrap.com/docs/standard/extended/registration/</a:t>
             </a:r>
-            <a:endParaRPr lang="fr-FR"/>
+            <a:endParaRPr lang="fr-FR">
+              <a:cs typeface="Calibri" panose="020F0502020204030204"/>
+            </a:endParaRPr>
+          </a:p>
+          <a:p>
+            <a:r>
+              <a:rPr lang="en-US" dirty="0"/>
+              <a:t>https://mdbootstrap.com/docs/angular/directives/input/</a:t>
+            </a:r>
+            <a:endParaRPr lang="en-US" dirty="0">
+              <a:cs typeface="Calibri"/>
+            </a:endParaRPr>
           </a:p>
         </p:txBody>
       </p:sp>
@@ -3301,6 +3337,94 @@
           <a:bodyPr/>
           <a:lstStyle/>
           <a:p>
+            <a:r>
+              <a:rPr lang="en-US" dirty="0"/>
+              <a:t>https://www.w3schools.com/howto/howto_js_tabs.asp</a:t>
+            </a:r>
+            <a:endParaRPr lang="fr-FR" dirty="0"/>
+          </a:p>
+        </p:txBody>
+      </p:sp>
+      <p:sp>
+        <p:nvSpPr>
+          <p:cNvPr id="4" name="Espace réservé du numéro de diapositive 3"/>
+          <p:cNvSpPr>
+            <a:spLocks noGrp="1"/>
+          </p:cNvSpPr>
+          <p:nvPr>
+            <p:ph type="sldNum" sz="quarter" idx="5"/>
+          </p:nvPr>
+        </p:nvSpPr>
+        <p:spPr/>
+        <p:txBody>
+          <a:bodyPr/>
+          <a:lstStyle/>
+          <a:p>
+            <a:fld id="{DA63055B-B41F-4580-8B0E-A9D7CE285253}" type="slidenum">
+              <a:rPr lang="fr-FR"/>
+              <a:t>5</a:t>
+            </a:fld>
+            <a:endParaRPr lang="fr-FR"/>
+          </a:p>
+        </p:txBody>
+      </p:sp>
+    </p:spTree>
+    <p:extLst>
+      <p:ext uri="{BB962C8B-B14F-4D97-AF65-F5344CB8AC3E}">
+        <p14:creationId xmlns:p14="http://schemas.microsoft.com/office/powerpoint/2010/main" val="799204878"/>
+      </p:ext>
+    </p:extLst>
+  </p:cSld>
+  <p:clrMapOvr>
+    <a:masterClrMapping/>
+  </p:clrMapOvr>
+</p:notes>
+</file>
+
+<file path=ppt/notesSlides/notesSlide4.xml><?xml version="1.0" encoding="utf-8"?>
+<p:notes xmlns:a="http://schemas.openxmlformats.org/drawingml/2006/main" xmlns:r="http://schemas.openxmlformats.org/officeDocument/2006/relationships" xmlns:p="http://schemas.openxmlformats.org/presentationml/2006/main">
+  <p:cSld>
+    <p:spTree>
+      <p:nvGrpSpPr>
+        <p:cNvPr id="1" name=""/>
+        <p:cNvGrpSpPr/>
+        <p:nvPr/>
+      </p:nvGrpSpPr>
+      <p:grpSpPr>
+        <a:xfrm>
+          <a:off x="0" y="0"/>
+          <a:ext cx="0" cy="0"/>
+          <a:chOff x="0" y="0"/>
+          <a:chExt cx="0" cy="0"/>
+        </a:xfrm>
+      </p:grpSpPr>
+      <p:sp>
+        <p:nvSpPr>
+          <p:cNvPr id="2" name="Espace réservé de l'image des diapositives 1"/>
+          <p:cNvSpPr>
+            <a:spLocks noGrp="1" noRot="1" noChangeAspect="1"/>
+          </p:cNvSpPr>
+          <p:nvPr>
+            <p:ph type="sldImg"/>
+          </p:nvPr>
+        </p:nvSpPr>
+        <p:spPr/>
+      </p:sp>
+      <p:sp>
+        <p:nvSpPr>
+          <p:cNvPr id="3" name="Espace réservé des notes 2"/>
+          <p:cNvSpPr>
+            <a:spLocks noGrp="1"/>
+          </p:cNvSpPr>
+          <p:nvPr>
+            <p:ph type="body" idx="1"/>
+          </p:nvPr>
+        </p:nvSpPr>
+        <p:spPr/>
+        <p:txBody>
+          <a:bodyPr/>
+          <a:lstStyle/>
+          <a:p>
             <a:endParaRPr lang="en-US">
               <a:cs typeface="Calibri"/>
             </a:endParaRPr>
@@ -3342,7 +3466,7 @@
 </p:notes>
 </file>
 
-<file path=ppt/notesSlides/notesSlide4.xml><?xml version="1.0" encoding="utf-8"?>
+<file path=ppt/notesSlides/notesSlide5.xml><?xml version="1.0" encoding="utf-8"?>
 <p:notes xmlns:a="http://schemas.openxmlformats.org/drawingml/2006/main" xmlns:r="http://schemas.openxmlformats.org/officeDocument/2006/relationships" xmlns:p="http://schemas.openxmlformats.org/presentationml/2006/main">
   <p:cSld>
     <p:spTree>
@@ -3633,7 +3757,7 @@
           <a:p>
             <a:fld id="{01D3DCB8-9272-4B59-BBA5-EE8745829236}" type="datetimeFigureOut">
               <a:rPr lang="fr-FR" smtClean="0"/>
-              <a:t>10/06/2022</a:t>
+              <a:t>15/06/2022</a:t>
             </a:fld>
             <a:endParaRPr lang="fr-FR"/>
           </a:p>
@@ -3687,7 +3811,7 @@
           <a:p>
             <a:fld id="{7C0ED6ED-2E97-4D36-94B5-A78F17CE8CD6}" type="slidenum">
               <a:rPr lang="fr-FR" smtClean="0"/>
-              <a:t>‹#›</a:t>
+              <a:t>‹N°›</a:t>
             </a:fld>
             <a:endParaRPr lang="fr-FR"/>
           </a:p>
@@ -3831,7 +3955,7 @@
           <a:p>
             <a:fld id="{01D3DCB8-9272-4B59-BBA5-EE8745829236}" type="datetimeFigureOut">
               <a:rPr lang="fr-FR" smtClean="0"/>
-              <a:t>10/06/2022</a:t>
+              <a:t>15/06/2022</a:t>
             </a:fld>
             <a:endParaRPr lang="fr-FR"/>
           </a:p>
@@ -3885,7 +4009,7 @@
           <a:p>
             <a:fld id="{7C0ED6ED-2E97-4D36-94B5-A78F17CE8CD6}" type="slidenum">
               <a:rPr lang="fr-FR" smtClean="0"/>
-              <a:t>‹#›</a:t>
+              <a:t>‹N°›</a:t>
             </a:fld>
             <a:endParaRPr lang="fr-FR"/>
           </a:p>
@@ -4039,7 +4163,7 @@
           <a:p>
             <a:fld id="{01D3DCB8-9272-4B59-BBA5-EE8745829236}" type="datetimeFigureOut">
               <a:rPr lang="fr-FR" smtClean="0"/>
-              <a:t>10/06/2022</a:t>
+              <a:t>15/06/2022</a:t>
             </a:fld>
             <a:endParaRPr lang="fr-FR"/>
           </a:p>
@@ -4093,7 +4217,7 @@
           <a:p>
             <a:fld id="{7C0ED6ED-2E97-4D36-94B5-A78F17CE8CD6}" type="slidenum">
               <a:rPr lang="fr-FR" smtClean="0"/>
-              <a:t>‹#›</a:t>
+              <a:t>‹N°›</a:t>
             </a:fld>
             <a:endParaRPr lang="fr-FR"/>
           </a:p>
@@ -4237,7 +4361,7 @@
           <a:p>
             <a:fld id="{01D3DCB8-9272-4B59-BBA5-EE8745829236}" type="datetimeFigureOut">
               <a:rPr lang="fr-FR" smtClean="0"/>
-              <a:t>10/06/2022</a:t>
+              <a:t>15/06/2022</a:t>
             </a:fld>
             <a:endParaRPr lang="fr-FR"/>
           </a:p>
@@ -4291,7 +4415,7 @@
           <a:p>
             <a:fld id="{7C0ED6ED-2E97-4D36-94B5-A78F17CE8CD6}" type="slidenum">
               <a:rPr lang="fr-FR" smtClean="0"/>
-              <a:t>‹#›</a:t>
+              <a:t>‹N°›</a:t>
             </a:fld>
             <a:endParaRPr lang="fr-FR"/>
           </a:p>
@@ -4512,7 +4636,7 @@
           <a:p>
             <a:fld id="{01D3DCB8-9272-4B59-BBA5-EE8745829236}" type="datetimeFigureOut">
               <a:rPr lang="fr-FR" smtClean="0"/>
-              <a:t>10/06/2022</a:t>
+              <a:t>15/06/2022</a:t>
             </a:fld>
             <a:endParaRPr lang="fr-FR"/>
           </a:p>
@@ -4566,7 +4690,7 @@
           <a:p>
             <a:fld id="{7C0ED6ED-2E97-4D36-94B5-A78F17CE8CD6}" type="slidenum">
               <a:rPr lang="fr-FR" smtClean="0"/>
-              <a:t>‹#›</a:t>
+              <a:t>‹N°›</a:t>
             </a:fld>
             <a:endParaRPr lang="fr-FR"/>
           </a:p>
@@ -4777,7 +4901,7 @@
           <a:p>
             <a:fld id="{01D3DCB8-9272-4B59-BBA5-EE8745829236}" type="datetimeFigureOut">
               <a:rPr lang="fr-FR" smtClean="0"/>
-              <a:t>10/06/2022</a:t>
+              <a:t>15/06/2022</a:t>
             </a:fld>
             <a:endParaRPr lang="fr-FR"/>
           </a:p>
@@ -4831,7 +4955,7 @@
           <a:p>
             <a:fld id="{7C0ED6ED-2E97-4D36-94B5-A78F17CE8CD6}" type="slidenum">
               <a:rPr lang="fr-FR" smtClean="0"/>
-              <a:t>‹#›</a:t>
+              <a:t>‹N°›</a:t>
             </a:fld>
             <a:endParaRPr lang="fr-FR"/>
           </a:p>
@@ -5189,7 +5313,7 @@
           <a:p>
             <a:fld id="{01D3DCB8-9272-4B59-BBA5-EE8745829236}" type="datetimeFigureOut">
               <a:rPr lang="fr-FR" smtClean="0"/>
-              <a:t>10/06/2022</a:t>
+              <a:t>15/06/2022</a:t>
             </a:fld>
             <a:endParaRPr lang="fr-FR"/>
           </a:p>
@@ -5243,7 +5367,7 @@
           <a:p>
             <a:fld id="{7C0ED6ED-2E97-4D36-94B5-A78F17CE8CD6}" type="slidenum">
               <a:rPr lang="fr-FR" smtClean="0"/>
-              <a:t>‹#›</a:t>
+              <a:t>‹N°›</a:t>
             </a:fld>
             <a:endParaRPr lang="fr-FR"/>
           </a:p>
@@ -5330,7 +5454,7 @@
           <a:p>
             <a:fld id="{01D3DCB8-9272-4B59-BBA5-EE8745829236}" type="datetimeFigureOut">
               <a:rPr lang="fr-FR" smtClean="0"/>
-              <a:t>10/06/2022</a:t>
+              <a:t>15/06/2022</a:t>
             </a:fld>
             <a:endParaRPr lang="fr-FR"/>
           </a:p>
@@ -5384,7 +5508,7 @@
           <a:p>
             <a:fld id="{7C0ED6ED-2E97-4D36-94B5-A78F17CE8CD6}" type="slidenum">
               <a:rPr lang="fr-FR" smtClean="0"/>
-              <a:t>‹#›</a:t>
+              <a:t>‹N°›</a:t>
             </a:fld>
             <a:endParaRPr lang="fr-FR"/>
           </a:p>
@@ -5443,7 +5567,7 @@
           <a:p>
             <a:fld id="{01D3DCB8-9272-4B59-BBA5-EE8745829236}" type="datetimeFigureOut">
               <a:rPr lang="fr-FR" smtClean="0"/>
-              <a:t>10/06/2022</a:t>
+              <a:t>15/06/2022</a:t>
             </a:fld>
             <a:endParaRPr lang="fr-FR"/>
           </a:p>
@@ -5497,7 +5621,7 @@
           <a:p>
             <a:fld id="{7C0ED6ED-2E97-4D36-94B5-A78F17CE8CD6}" type="slidenum">
               <a:rPr lang="fr-FR" smtClean="0"/>
-              <a:t>‹#›</a:t>
+              <a:t>‹N°›</a:t>
             </a:fld>
             <a:endParaRPr lang="fr-FR"/>
           </a:p>
@@ -5754,7 +5878,7 @@
           <a:p>
             <a:fld id="{01D3DCB8-9272-4B59-BBA5-EE8745829236}" type="datetimeFigureOut">
               <a:rPr lang="fr-FR" smtClean="0"/>
-              <a:t>10/06/2022</a:t>
+              <a:t>15/06/2022</a:t>
             </a:fld>
             <a:endParaRPr lang="fr-FR"/>
           </a:p>
@@ -5808,7 +5932,7 @@
           <a:p>
             <a:fld id="{7C0ED6ED-2E97-4D36-94B5-A78F17CE8CD6}" type="slidenum">
               <a:rPr lang="fr-FR" smtClean="0"/>
-              <a:t>‹#›</a:t>
+              <a:t>‹N°›</a:t>
             </a:fld>
             <a:endParaRPr lang="fr-FR"/>
           </a:p>
@@ -6042,7 +6166,7 @@
           <a:p>
             <a:fld id="{01D3DCB8-9272-4B59-BBA5-EE8745829236}" type="datetimeFigureOut">
               <a:rPr lang="fr-FR" smtClean="0"/>
-              <a:t>10/06/2022</a:t>
+              <a:t>15/06/2022</a:t>
             </a:fld>
             <a:endParaRPr lang="fr-FR"/>
           </a:p>
@@ -6096,7 +6220,7 @@
           <a:p>
             <a:fld id="{7C0ED6ED-2E97-4D36-94B5-A78F17CE8CD6}" type="slidenum">
               <a:rPr lang="fr-FR" smtClean="0"/>
-              <a:t>‹#›</a:t>
+              <a:t>‹N°›</a:t>
             </a:fld>
             <a:endParaRPr lang="fr-FR"/>
           </a:p>
@@ -6283,7 +6407,7 @@
           <a:p>
             <a:fld id="{01D3DCB8-9272-4B59-BBA5-EE8745829236}" type="datetimeFigureOut">
               <a:rPr lang="fr-FR" smtClean="0"/>
-              <a:t>10/06/2022</a:t>
+              <a:t>15/06/2022</a:t>
             </a:fld>
             <a:endParaRPr lang="fr-FR"/>
           </a:p>
@@ -6373,7 +6497,7 @@
           <a:p>
             <a:fld id="{7C0ED6ED-2E97-4D36-94B5-A78F17CE8CD6}" type="slidenum">
               <a:rPr lang="fr-FR" smtClean="0"/>
-              <a:t>‹#›</a:t>
+              <a:t>‹N°›</a:t>
             </a:fld>
             <a:endParaRPr lang="fr-FR"/>
           </a:p>
@@ -16515,7 +16639,7 @@
           <p:nvPr/>
         </p:nvPicPr>
         <p:blipFill>
-          <a:blip r:embed="rId2"/>
+          <a:blip r:embed="rId3"/>
           <a:stretch>
             <a:fillRect/>
           </a:stretch>
@@ -16545,7 +16669,7 @@
           <p:nvPr/>
         </p:nvPicPr>
         <p:blipFill>
-          <a:blip r:embed="rId2"/>
+          <a:blip r:embed="rId3"/>
           <a:stretch>
             <a:fillRect/>
           </a:stretch>

</xml_diff>